<commit_message>
finished one retex.. godammit it takes time
</commit_message>
<xml_diff>
--- a/sae_retex/Lowatem.pptx
+++ b/sae_retex/Lowatem.pptx
@@ -3882,14 +3882,13 @@
               <a:t>Réaliser une intelligence </a:t>
             </a:r>
             <a:r>
-              <a:rPr lang="fr-FR" b="0" dirty="0" err="1" smtClean="0"/>
-              <a:t>artificelle</a:t>
-            </a:r>
-            <a:r>
               <a:rPr lang="fr-FR" b="0" dirty="0" smtClean="0"/>
-              <a:t> de décision</a:t>
-            </a:r>
-            <a:endParaRPr lang="fr-FR" b="0" dirty="0" smtClean="0"/>
+              <a:t>artificielle </a:t>
+            </a:r>
+            <a:r>
+              <a:rPr lang="fr-FR" b="0" dirty="0" smtClean="0"/>
+              <a:t>de décision</a:t>
+            </a:r>
           </a:p>
           <a:p>
             <a:pPr>
@@ -4204,8 +4203,8 @@
         </p:nvSpPr>
         <p:spPr>
           <a:xfrm>
-            <a:off x="526812" y="4137124"/>
-            <a:ext cx="2673175" cy="1477328"/>
+            <a:off x="4080981" y="3696638"/>
+            <a:ext cx="1919318" cy="2308324"/>
           </a:xfrm>
           <a:prstGeom prst="rect">
             <a:avLst/>
@@ -4218,19 +4217,57 @@
           </a:bodyPr>
           <a:lstStyle/>
           <a:p>
-            <a:pPr algn="just"/>
+            <a:pPr algn="l"/>
             <a:r>
               <a:rPr lang="fr-FR" dirty="0" smtClean="0"/>
               <a:t>Deux IA fonctionnelles, dont</a:t>
             </a:r>
             <a:r>
               <a:rPr lang="fr-FR" baseline="0" dirty="0" smtClean="0"/>
-              <a:t> l’une a remporté le tournoi opposant les IA de tous les étudiants de la promotion</a:t>
+              <a:t> l’une a remporté le tournoi opposant les IA de tous les </a:t>
+            </a:r>
+            <a:r>
+              <a:rPr lang="fr-FR" baseline="0" dirty="0" smtClean="0"/>
+              <a:t>groupes </a:t>
+            </a:r>
+            <a:r>
+              <a:rPr lang="fr-FR" baseline="0" dirty="0" smtClean="0"/>
+              <a:t>de la promotion</a:t>
             </a:r>
             <a:endParaRPr lang="fr-FR" dirty="0"/>
           </a:p>
         </p:txBody>
       </p:sp>
+      <p:pic>
+        <p:nvPicPr>
+          <p:cNvPr id="14" name="Image 13"/>
+          <p:cNvPicPr>
+            <a:picLocks noChangeAspect="1"/>
+          </p:cNvPicPr>
+          <p:nvPr userDrawn="1"/>
+        </p:nvPicPr>
+        <p:blipFill>
+          <a:blip r:embed="rId18" cstate="print">
+            <a:extLst>
+              <a:ext uri="{28A0092B-C50C-407E-A947-70E740481C1C}">
+                <a14:useLocalDpi xmlns:a14="http://schemas.microsoft.com/office/drawing/2010/main" val="0"/>
+              </a:ext>
+            </a:extLst>
+          </a:blip>
+          <a:stretch>
+            <a:fillRect/>
+          </a:stretch>
+        </p:blipFill>
+        <p:spPr>
+          <a:xfrm>
+            <a:off x="452011" y="3999395"/>
+            <a:ext cx="3534024" cy="1918975"/>
+          </a:xfrm>
+          <a:prstGeom prst="rect">
+            <a:avLst/>
+          </a:prstGeom>
+        </p:spPr>
+      </p:pic>
     </p:spTree>
     <p:extLst>
       <p:ext uri="{BB962C8B-B14F-4D97-AF65-F5344CB8AC3E}">

</xml_diff>